<commit_message>
Fix figure text size
</commit_message>
<xml_diff>
--- a/dfr_metadata/book_chapter/fig/fat1.pptx
+++ b/dfr_metadata/book_chapter/fig/fat1.pptx
@@ -7,7 +7,7 @@
   <p:sldIdLst>
     <p:sldId id="256" r:id="rId3"/>
   </p:sldIdLst>
-  <p:sldSz cx="12192000" cy="6858000"/>
+  <p:sldSz cx="9144000" cy="6858000"/>
   <p:notesSz cx="7772400" cy="10058400"/>
 </p:presentation>
 </file>
@@ -63,8 +63,8 @@
         </p:nvSpPr>
         <p:spPr>
           <a:xfrm>
-            <a:off x="609480" y="273600"/>
-            <a:ext cx="10972440" cy="1144800"/>
+            <a:off x="456840" y="273600"/>
+            <a:ext cx="8229240" cy="1144800"/>
           </a:xfrm>
           <a:prstGeom prst="rect">
             <a:avLst/>
@@ -98,8 +98,8 @@
         </p:nvSpPr>
         <p:spPr>
           <a:xfrm>
-            <a:off x="609480" y="1604520"/>
-            <a:ext cx="10972440" cy="1896840"/>
+            <a:off x="456840" y="1604520"/>
+            <a:ext cx="8229240" cy="1896840"/>
           </a:xfrm>
           <a:prstGeom prst="rect">
             <a:avLst/>
@@ -132,8 +132,8 @@
         </p:nvSpPr>
         <p:spPr>
           <a:xfrm>
-            <a:off x="609480" y="3682080"/>
-            <a:ext cx="10972440" cy="1896840"/>
+            <a:off x="456840" y="3682080"/>
+            <a:ext cx="8229240" cy="1896840"/>
           </a:xfrm>
           <a:prstGeom prst="rect">
             <a:avLst/>
@@ -188,8 +188,8 @@
         </p:nvSpPr>
         <p:spPr>
           <a:xfrm>
-            <a:off x="609480" y="273600"/>
-            <a:ext cx="10972440" cy="1144800"/>
+            <a:off x="456840" y="273600"/>
+            <a:ext cx="8229240" cy="1144800"/>
           </a:xfrm>
           <a:prstGeom prst="rect">
             <a:avLst/>
@@ -223,8 +223,8 @@
         </p:nvSpPr>
         <p:spPr>
           <a:xfrm>
-            <a:off x="609480" y="1604520"/>
-            <a:ext cx="5354280" cy="1896840"/>
+            <a:off x="456840" y="1604520"/>
+            <a:ext cx="4015800" cy="1896840"/>
           </a:xfrm>
           <a:prstGeom prst="rect">
             <a:avLst/>
@@ -257,8 +257,8 @@
         </p:nvSpPr>
         <p:spPr>
           <a:xfrm>
-            <a:off x="6231960" y="1604520"/>
-            <a:ext cx="5354280" cy="1896840"/>
+            <a:off x="4673880" y="1604520"/>
+            <a:ext cx="4015800" cy="1896840"/>
           </a:xfrm>
           <a:prstGeom prst="rect">
             <a:avLst/>
@@ -291,8 +291,8 @@
         </p:nvSpPr>
         <p:spPr>
           <a:xfrm>
-            <a:off x="609480" y="3682080"/>
-            <a:ext cx="5354280" cy="1896840"/>
+            <a:off x="456840" y="3682080"/>
+            <a:ext cx="4015800" cy="1896840"/>
           </a:xfrm>
           <a:prstGeom prst="rect">
             <a:avLst/>
@@ -325,8 +325,8 @@
         </p:nvSpPr>
         <p:spPr>
           <a:xfrm>
-            <a:off x="6231960" y="3682080"/>
-            <a:ext cx="5354280" cy="1896840"/>
+            <a:off x="4673880" y="3682080"/>
+            <a:ext cx="4015800" cy="1896840"/>
           </a:xfrm>
           <a:prstGeom prst="rect">
             <a:avLst/>
@@ -381,8 +381,8 @@
         </p:nvSpPr>
         <p:spPr>
           <a:xfrm>
-            <a:off x="609480" y="273600"/>
-            <a:ext cx="10972440" cy="1144800"/>
+            <a:off x="456840" y="273600"/>
+            <a:ext cx="8229240" cy="1144800"/>
           </a:xfrm>
           <a:prstGeom prst="rect">
             <a:avLst/>
@@ -416,8 +416,8 @@
         </p:nvSpPr>
         <p:spPr>
           <a:xfrm>
-            <a:off x="609480" y="1604520"/>
-            <a:ext cx="3533040" cy="1896840"/>
+            <a:off x="456840" y="1604520"/>
+            <a:ext cx="2649600" cy="1896840"/>
           </a:xfrm>
           <a:prstGeom prst="rect">
             <a:avLst/>
@@ -450,8 +450,8 @@
         </p:nvSpPr>
         <p:spPr>
           <a:xfrm>
-            <a:off x="4319640" y="1604520"/>
-            <a:ext cx="3533040" cy="1896840"/>
+            <a:off x="3239280" y="1604520"/>
+            <a:ext cx="2649600" cy="1896840"/>
           </a:xfrm>
           <a:prstGeom prst="rect">
             <a:avLst/>
@@ -484,8 +484,8 @@
         </p:nvSpPr>
         <p:spPr>
           <a:xfrm>
-            <a:off x="8029800" y="1604520"/>
-            <a:ext cx="3533040" cy="1896840"/>
+            <a:off x="6021720" y="1604520"/>
+            <a:ext cx="2649600" cy="1896840"/>
           </a:xfrm>
           <a:prstGeom prst="rect">
             <a:avLst/>
@@ -518,8 +518,8 @@
         </p:nvSpPr>
         <p:spPr>
           <a:xfrm>
-            <a:off x="609480" y="3682080"/>
-            <a:ext cx="3533040" cy="1896840"/>
+            <a:off x="456840" y="3682080"/>
+            <a:ext cx="2649600" cy="1896840"/>
           </a:xfrm>
           <a:prstGeom prst="rect">
             <a:avLst/>
@@ -552,8 +552,8 @@
         </p:nvSpPr>
         <p:spPr>
           <a:xfrm>
-            <a:off x="4319640" y="3682080"/>
-            <a:ext cx="3533040" cy="1896840"/>
+            <a:off x="3239280" y="3682080"/>
+            <a:ext cx="2649600" cy="1896840"/>
           </a:xfrm>
           <a:prstGeom prst="rect">
             <a:avLst/>
@@ -586,8 +586,8 @@
         </p:nvSpPr>
         <p:spPr>
           <a:xfrm>
-            <a:off x="8029800" y="3682080"/>
-            <a:ext cx="3533040" cy="1896840"/>
+            <a:off x="6021720" y="3682080"/>
+            <a:ext cx="2649600" cy="1896840"/>
           </a:xfrm>
           <a:prstGeom prst="rect">
             <a:avLst/>
@@ -642,8 +642,8 @@
         </p:nvSpPr>
         <p:spPr>
           <a:xfrm>
-            <a:off x="609480" y="273600"/>
-            <a:ext cx="10972440" cy="1144800"/>
+            <a:off x="456840" y="273600"/>
+            <a:ext cx="8229240" cy="1144800"/>
           </a:xfrm>
           <a:prstGeom prst="rect">
             <a:avLst/>
@@ -677,8 +677,8 @@
         </p:nvSpPr>
         <p:spPr>
           <a:xfrm>
-            <a:off x="609480" y="1604520"/>
-            <a:ext cx="10972440" cy="3977280"/>
+            <a:off x="456840" y="1604520"/>
+            <a:ext cx="8229240" cy="3977280"/>
           </a:xfrm>
           <a:prstGeom prst="rect">
             <a:avLst/>
@@ -734,8 +734,8 @@
         </p:nvSpPr>
         <p:spPr>
           <a:xfrm>
-            <a:off x="609480" y="273600"/>
-            <a:ext cx="10972440" cy="1144800"/>
+            <a:off x="456840" y="273600"/>
+            <a:ext cx="8229240" cy="1144800"/>
           </a:xfrm>
           <a:prstGeom prst="rect">
             <a:avLst/>
@@ -769,8 +769,8 @@
         </p:nvSpPr>
         <p:spPr>
           <a:xfrm>
-            <a:off x="609480" y="1604520"/>
-            <a:ext cx="10972440" cy="3977280"/>
+            <a:off x="456840" y="1604520"/>
+            <a:ext cx="8229240" cy="3977280"/>
           </a:xfrm>
           <a:prstGeom prst="rect">
             <a:avLst/>
@@ -825,8 +825,8 @@
         </p:nvSpPr>
         <p:spPr>
           <a:xfrm>
-            <a:off x="609480" y="273600"/>
-            <a:ext cx="10972440" cy="1144800"/>
+            <a:off x="456840" y="273600"/>
+            <a:ext cx="8229240" cy="1144800"/>
           </a:xfrm>
           <a:prstGeom prst="rect">
             <a:avLst/>
@@ -860,8 +860,8 @@
         </p:nvSpPr>
         <p:spPr>
           <a:xfrm>
-            <a:off x="609480" y="1604520"/>
-            <a:ext cx="5354280" cy="3977280"/>
+            <a:off x="456840" y="1604520"/>
+            <a:ext cx="4015800" cy="3977280"/>
           </a:xfrm>
           <a:prstGeom prst="rect">
             <a:avLst/>
@@ -894,8 +894,8 @@
         </p:nvSpPr>
         <p:spPr>
           <a:xfrm>
-            <a:off x="6231960" y="1604520"/>
-            <a:ext cx="5354280" cy="3977280"/>
+            <a:off x="4673880" y="1604520"/>
+            <a:ext cx="4015800" cy="3977280"/>
           </a:xfrm>
           <a:prstGeom prst="rect">
             <a:avLst/>
@@ -950,8 +950,8 @@
         </p:nvSpPr>
         <p:spPr>
           <a:xfrm>
-            <a:off x="609480" y="273600"/>
-            <a:ext cx="10972440" cy="1144800"/>
+            <a:off x="456840" y="273600"/>
+            <a:ext cx="8229240" cy="1144800"/>
           </a:xfrm>
           <a:prstGeom prst="rect">
             <a:avLst/>
@@ -1007,8 +1007,8 @@
         </p:nvSpPr>
         <p:spPr>
           <a:xfrm>
-            <a:off x="609480" y="273600"/>
-            <a:ext cx="10972440" cy="5307840"/>
+            <a:off x="456840" y="273600"/>
+            <a:ext cx="8229240" cy="5307840"/>
           </a:xfrm>
           <a:prstGeom prst="rect">
             <a:avLst/>
@@ -1064,8 +1064,8 @@
         </p:nvSpPr>
         <p:spPr>
           <a:xfrm>
-            <a:off x="609480" y="273600"/>
-            <a:ext cx="10972440" cy="1144800"/>
+            <a:off x="456840" y="273600"/>
+            <a:ext cx="8229240" cy="1144800"/>
           </a:xfrm>
           <a:prstGeom prst="rect">
             <a:avLst/>
@@ -1099,8 +1099,8 @@
         </p:nvSpPr>
         <p:spPr>
           <a:xfrm>
-            <a:off x="609480" y="1604520"/>
-            <a:ext cx="5354280" cy="1896840"/>
+            <a:off x="456840" y="1604520"/>
+            <a:ext cx="4015800" cy="1896840"/>
           </a:xfrm>
           <a:prstGeom prst="rect">
             <a:avLst/>
@@ -1133,8 +1133,8 @@
         </p:nvSpPr>
         <p:spPr>
           <a:xfrm>
-            <a:off x="6231960" y="1604520"/>
-            <a:ext cx="5354280" cy="3977280"/>
+            <a:off x="4673880" y="1604520"/>
+            <a:ext cx="4015800" cy="3977280"/>
           </a:xfrm>
           <a:prstGeom prst="rect">
             <a:avLst/>
@@ -1167,8 +1167,8 @@
         </p:nvSpPr>
         <p:spPr>
           <a:xfrm>
-            <a:off x="609480" y="3682080"/>
-            <a:ext cx="5354280" cy="1896840"/>
+            <a:off x="456840" y="3682080"/>
+            <a:ext cx="4015800" cy="1896840"/>
           </a:xfrm>
           <a:prstGeom prst="rect">
             <a:avLst/>
@@ -1223,8 +1223,8 @@
         </p:nvSpPr>
         <p:spPr>
           <a:xfrm>
-            <a:off x="609480" y="273600"/>
-            <a:ext cx="10972440" cy="1144800"/>
+            <a:off x="456840" y="273600"/>
+            <a:ext cx="8229240" cy="1144800"/>
           </a:xfrm>
           <a:prstGeom prst="rect">
             <a:avLst/>
@@ -1258,8 +1258,8 @@
         </p:nvSpPr>
         <p:spPr>
           <a:xfrm>
-            <a:off x="609480" y="1604520"/>
-            <a:ext cx="5354280" cy="3977280"/>
+            <a:off x="456840" y="1604520"/>
+            <a:ext cx="4015800" cy="3977280"/>
           </a:xfrm>
           <a:prstGeom prst="rect">
             <a:avLst/>
@@ -1292,8 +1292,8 @@
         </p:nvSpPr>
         <p:spPr>
           <a:xfrm>
-            <a:off x="6231960" y="1604520"/>
-            <a:ext cx="5354280" cy="1896840"/>
+            <a:off x="4673880" y="1604520"/>
+            <a:ext cx="4015800" cy="1896840"/>
           </a:xfrm>
           <a:prstGeom prst="rect">
             <a:avLst/>
@@ -1326,8 +1326,8 @@
         </p:nvSpPr>
         <p:spPr>
           <a:xfrm>
-            <a:off x="6231960" y="3682080"/>
-            <a:ext cx="5354280" cy="1896840"/>
+            <a:off x="4673880" y="3682080"/>
+            <a:ext cx="4015800" cy="1896840"/>
           </a:xfrm>
           <a:prstGeom prst="rect">
             <a:avLst/>
@@ -1382,8 +1382,8 @@
         </p:nvSpPr>
         <p:spPr>
           <a:xfrm>
-            <a:off x="609480" y="273600"/>
-            <a:ext cx="10972440" cy="1144800"/>
+            <a:off x="456840" y="273600"/>
+            <a:ext cx="8229240" cy="1144800"/>
           </a:xfrm>
           <a:prstGeom prst="rect">
             <a:avLst/>
@@ -1417,8 +1417,8 @@
         </p:nvSpPr>
         <p:spPr>
           <a:xfrm>
-            <a:off x="609480" y="1604520"/>
-            <a:ext cx="5354280" cy="1896840"/>
+            <a:off x="456840" y="1604520"/>
+            <a:ext cx="4015800" cy="1896840"/>
           </a:xfrm>
           <a:prstGeom prst="rect">
             <a:avLst/>
@@ -1451,8 +1451,8 @@
         </p:nvSpPr>
         <p:spPr>
           <a:xfrm>
-            <a:off x="6231960" y="1604520"/>
-            <a:ext cx="5354280" cy="1896840"/>
+            <a:off x="4673880" y="1604520"/>
+            <a:ext cx="4015800" cy="1896840"/>
           </a:xfrm>
           <a:prstGeom prst="rect">
             <a:avLst/>
@@ -1485,8 +1485,8 @@
         </p:nvSpPr>
         <p:spPr>
           <a:xfrm>
-            <a:off x="609480" y="3682080"/>
-            <a:ext cx="10972440" cy="1896840"/>
+            <a:off x="456840" y="3682080"/>
+            <a:ext cx="8229240" cy="1896840"/>
           </a:xfrm>
           <a:prstGeom prst="rect">
             <a:avLst/>
@@ -1548,8 +1548,8 @@
         </p:nvSpPr>
         <p:spPr>
           <a:xfrm>
-            <a:off x="609480" y="273600"/>
-            <a:ext cx="10972440" cy="1144800"/>
+            <a:off x="456840" y="273600"/>
+            <a:ext cx="8229240" cy="1144800"/>
           </a:xfrm>
           <a:prstGeom prst="rect">
             <a:avLst/>
@@ -1589,8 +1589,8 @@
         </p:nvSpPr>
         <p:spPr>
           <a:xfrm>
-            <a:off x="609480" y="1604520"/>
-            <a:ext cx="10972440" cy="3977280"/>
+            <a:off x="456840" y="1604520"/>
+            <a:ext cx="8229240" cy="3977280"/>
           </a:xfrm>
           <a:prstGeom prst="rect">
             <a:avLst/>
@@ -1783,6 +1783,13 @@
 <file path=ppt/slides/slide1.xml><?xml version="1.0" encoding="utf-8"?>
 <p:sld xmlns:a="http://schemas.openxmlformats.org/drawingml/2006/main" xmlns:p="http://schemas.openxmlformats.org/presentationml/2006/main" xmlns:r="http://schemas.openxmlformats.org/officeDocument/2006/relationships" xmlns:p14="http://schemas.microsoft.com/office/powerpoint/2010/main" xmlns:p15="http://schemas.microsoft.com/office/powerpoint/2012/main" xmlns:mc="http://schemas.openxmlformats.org/markup-compatibility/2006">
   <p:cSld>
+    <p:bg>
+      <p:bgPr>
+        <a:solidFill>
+          <a:srgbClr val="ffffff"/>
+        </a:solidFill>
+      </p:bgPr>
+    </p:bg>
     <p:spTree>
       <p:nvGrpSpPr>
         <p:cNvPr id="1" name=""/>
@@ -1805,8 +1812,8 @@
         </p:nvSpPr>
         <p:spPr>
           <a:xfrm>
-            <a:off x="3995640" y="1429920"/>
-            <a:ext cx="3583440" cy="770760"/>
+            <a:off x="1855800" y="1622880"/>
+            <a:ext cx="3582720" cy="770400"/>
           </a:xfrm>
           <a:prstGeom prst="rect">
             <a:avLst/>
@@ -1841,8 +1848,8 @@
         </p:nvSpPr>
         <p:spPr>
           <a:xfrm>
-            <a:off x="8563320" y="451440"/>
-            <a:ext cx="885960" cy="5238720"/>
+            <a:off x="6423480" y="644400"/>
+            <a:ext cx="885600" cy="5238360"/>
           </a:xfrm>
           <a:prstGeom prst="rect">
             <a:avLst/>
@@ -1877,7 +1884,7 @@
         </p:nvSpPr>
         <p:spPr>
           <a:xfrm>
-            <a:off x="8549640" y="802800"/>
+            <a:off x="6409440" y="995760"/>
             <a:ext cx="887760" cy="360"/>
           </a:xfrm>
           <a:prstGeom prst="line">
@@ -1910,7 +1917,7 @@
         </p:nvSpPr>
         <p:spPr>
           <a:xfrm>
-            <a:off x="8562240" y="1166760"/>
+            <a:off x="6422400" y="1359720"/>
             <a:ext cx="887760" cy="360"/>
           </a:xfrm>
           <a:prstGeom prst="line">
@@ -1943,7 +1950,7 @@
         </p:nvSpPr>
         <p:spPr>
           <a:xfrm>
-            <a:off x="8563320" y="2410920"/>
+            <a:off x="6423480" y="2603880"/>
             <a:ext cx="887400" cy="360"/>
           </a:xfrm>
           <a:prstGeom prst="line">
@@ -1976,7 +1983,7 @@
         </p:nvSpPr>
         <p:spPr>
           <a:xfrm>
-            <a:off x="8562240" y="2833200"/>
+            <a:off x="6422400" y="3026160"/>
             <a:ext cx="887760" cy="360"/>
           </a:xfrm>
           <a:prstGeom prst="line">
@@ -2009,7 +2016,7 @@
         </p:nvSpPr>
         <p:spPr>
           <a:xfrm>
-            <a:off x="8549640" y="3250080"/>
+            <a:off x="6409440" y="3443040"/>
             <a:ext cx="887760" cy="360"/>
           </a:xfrm>
           <a:prstGeom prst="line">
@@ -2042,7 +2049,7 @@
         </p:nvSpPr>
         <p:spPr>
           <a:xfrm>
-            <a:off x="8562240" y="3687480"/>
+            <a:off x="6422400" y="3880440"/>
             <a:ext cx="887760" cy="360"/>
           </a:xfrm>
           <a:prstGeom prst="line">
@@ -2075,7 +2082,7 @@
         </p:nvSpPr>
         <p:spPr>
           <a:xfrm>
-            <a:off x="8562240" y="4119480"/>
+            <a:off x="6422400" y="4312440"/>
             <a:ext cx="887760" cy="360"/>
           </a:xfrm>
           <a:prstGeom prst="line">
@@ -2108,7 +2115,7 @@
         </p:nvSpPr>
         <p:spPr>
           <a:xfrm>
-            <a:off x="8562240" y="4548240"/>
+            <a:off x="6422400" y="4741200"/>
             <a:ext cx="887760" cy="360"/>
           </a:xfrm>
           <a:prstGeom prst="line">
@@ -2141,8 +2148,8 @@
         </p:nvSpPr>
         <p:spPr>
           <a:xfrm rot="5400000">
-            <a:off x="8595720" y="2100240"/>
-            <a:ext cx="918720" cy="364320"/>
+            <a:off x="6455520" y="2292840"/>
+            <a:ext cx="918360" cy="364680"/>
           </a:xfrm>
           <a:prstGeom prst="rect">
             <a:avLst/>
@@ -2192,8 +2199,8 @@
         </p:nvSpPr>
         <p:spPr>
           <a:xfrm rot="5400000">
-            <a:off x="8920800" y="4795560"/>
-            <a:ext cx="354240" cy="364320"/>
+            <a:off x="6780960" y="4988160"/>
+            <a:ext cx="353880" cy="364680"/>
           </a:xfrm>
           <a:prstGeom prst="rect">
             <a:avLst/>
@@ -2243,8 +2250,8 @@
         </p:nvSpPr>
         <p:spPr>
           <a:xfrm>
-            <a:off x="3351240" y="4342680"/>
-            <a:ext cx="812520" cy="638640"/>
+            <a:off x="1211400" y="4535640"/>
+            <a:ext cx="812160" cy="639000"/>
           </a:xfrm>
           <a:prstGeom prst="rect">
             <a:avLst/>
@@ -2324,8 +2331,8 @@
         </p:nvSpPr>
         <p:spPr>
           <a:xfrm>
-            <a:off x="7142040" y="4339440"/>
-            <a:ext cx="803880" cy="638640"/>
+            <a:off x="5001840" y="4532400"/>
+            <a:ext cx="804240" cy="638280"/>
           </a:xfrm>
           <a:prstGeom prst="rect">
             <a:avLst/>
@@ -2405,7 +2412,7 @@
         </p:nvSpPr>
         <p:spPr>
           <a:xfrm>
-            <a:off x="5173560" y="1430280"/>
+            <a:off x="3033720" y="1623240"/>
             <a:ext cx="360" cy="771840"/>
           </a:xfrm>
           <a:prstGeom prst="line">
@@ -2438,7 +2445,7 @@
         </p:nvSpPr>
         <p:spPr>
           <a:xfrm>
-            <a:off x="6246720" y="1430280"/>
+            <a:off x="4106880" y="1623240"/>
             <a:ext cx="360" cy="771840"/>
           </a:xfrm>
           <a:prstGeom prst="line">
@@ -2471,8 +2478,8 @@
         </p:nvSpPr>
         <p:spPr>
           <a:xfrm>
-            <a:off x="6303960" y="1486080"/>
-            <a:ext cx="1278720" cy="638640"/>
+            <a:off x="4164120" y="1679040"/>
+            <a:ext cx="1278360" cy="639000"/>
           </a:xfrm>
           <a:prstGeom prst="rect">
             <a:avLst/>
@@ -2542,8 +2549,8 @@
         </p:nvSpPr>
         <p:spPr>
           <a:xfrm>
-            <a:off x="5267160" y="1503360"/>
-            <a:ext cx="841320" cy="638640"/>
+            <a:off x="3127320" y="1696320"/>
+            <a:ext cx="840960" cy="639000"/>
           </a:xfrm>
           <a:prstGeom prst="rect">
             <a:avLst/>
@@ -2613,8 +2620,8 @@
         </p:nvSpPr>
         <p:spPr>
           <a:xfrm>
-            <a:off x="4060800" y="1529280"/>
-            <a:ext cx="979920" cy="364320"/>
+            <a:off x="1921320" y="1722240"/>
+            <a:ext cx="979200" cy="364680"/>
           </a:xfrm>
           <a:prstGeom prst="rect">
             <a:avLst/>
@@ -2674,8 +2681,8 @@
         </p:nvSpPr>
         <p:spPr>
           <a:xfrm>
-            <a:off x="8559720" y="5843880"/>
-            <a:ext cx="1037520" cy="364320"/>
+            <a:off x="6419160" y="6036840"/>
+            <a:ext cx="1038960" cy="363960"/>
           </a:xfrm>
           <a:prstGeom prst="rect">
             <a:avLst/>
@@ -2725,8 +2732,8 @@
         </p:nvSpPr>
         <p:spPr>
           <a:xfrm>
-            <a:off x="9496440" y="2400840"/>
-            <a:ext cx="1186560" cy="364320"/>
+            <a:off x="7356240" y="2593800"/>
+            <a:ext cx="1186920" cy="363960"/>
           </a:xfrm>
           <a:prstGeom prst="rect">
             <a:avLst/>
@@ -2796,8 +2803,8 @@
         </p:nvSpPr>
         <p:spPr>
           <a:xfrm>
-            <a:off x="9506520" y="2867400"/>
-            <a:ext cx="1166400" cy="364320"/>
+            <a:off x="7365960" y="3060360"/>
+            <a:ext cx="1166760" cy="363960"/>
           </a:xfrm>
           <a:prstGeom prst="rect">
             <a:avLst/>
@@ -2867,8 +2874,8 @@
         </p:nvSpPr>
         <p:spPr>
           <a:xfrm>
-            <a:off x="9497520" y="3707640"/>
-            <a:ext cx="1186560" cy="364320"/>
+            <a:off x="7357320" y="3900600"/>
+            <a:ext cx="1186920" cy="363960"/>
           </a:xfrm>
           <a:prstGeom prst="rect">
             <a:avLst/>
@@ -2938,8 +2945,8 @@
         </p:nvSpPr>
         <p:spPr>
           <a:xfrm>
-            <a:off x="9496440" y="4150440"/>
-            <a:ext cx="1186560" cy="364320"/>
+            <a:off x="7356240" y="4343400"/>
+            <a:ext cx="1186920" cy="363960"/>
           </a:xfrm>
           <a:prstGeom prst="rect">
             <a:avLst/>
@@ -3009,8 +3016,8 @@
         </p:nvSpPr>
         <p:spPr>
           <a:xfrm>
-            <a:off x="8713800" y="2832840"/>
-            <a:ext cx="528120" cy="364320"/>
+            <a:off x="6573600" y="3025800"/>
+            <a:ext cx="528480" cy="363960"/>
           </a:xfrm>
           <a:prstGeom prst="rect">
             <a:avLst/>
@@ -3060,8 +3067,8 @@
         </p:nvSpPr>
         <p:spPr>
           <a:xfrm>
-            <a:off x="8728920" y="2415960"/>
-            <a:ext cx="528120" cy="364320"/>
+            <a:off x="6589080" y="2608920"/>
+            <a:ext cx="528480" cy="363960"/>
           </a:xfrm>
           <a:prstGeom prst="rect">
             <a:avLst/>
@@ -3111,8 +3118,8 @@
         </p:nvSpPr>
         <p:spPr>
           <a:xfrm>
-            <a:off x="8722440" y="3684960"/>
-            <a:ext cx="528120" cy="364320"/>
+            <a:off x="6582240" y="3877920"/>
+            <a:ext cx="528480" cy="363960"/>
           </a:xfrm>
           <a:prstGeom prst="rect">
             <a:avLst/>
@@ -3162,8 +3169,8 @@
         </p:nvSpPr>
         <p:spPr>
           <a:xfrm>
-            <a:off x="8714520" y="4101840"/>
-            <a:ext cx="545040" cy="364320"/>
+            <a:off x="6574320" y="4294800"/>
+            <a:ext cx="545400" cy="363960"/>
           </a:xfrm>
           <a:prstGeom prst="rect">
             <a:avLst/>
@@ -3213,8 +3220,8 @@
         </p:nvSpPr>
         <p:spPr>
           <a:xfrm>
-            <a:off x="4318920" y="990360"/>
-            <a:ext cx="2800800" cy="364320"/>
+            <a:off x="2179080" y="1183320"/>
+            <a:ext cx="2800440" cy="364680"/>
           </a:xfrm>
           <a:prstGeom prst="rect">
             <a:avLst/>
@@ -3284,8 +3291,8 @@
         </p:nvSpPr>
         <p:spPr>
           <a:xfrm rot="5400000">
-            <a:off x="3452400" y="2480760"/>
-            <a:ext cx="1060200" cy="474480"/>
+            <a:off x="1312920" y="2673720"/>
+            <a:ext cx="1059840" cy="474120"/>
           </a:xfrm>
           <a:prstGeom prst="bentConnector3">
             <a:avLst>
@@ -3321,8 +3328,8 @@
         </p:nvSpPr>
         <p:spPr>
           <a:xfrm>
-            <a:off x="3395160" y="3250800"/>
-            <a:ext cx="694080" cy="1002960"/>
+            <a:off x="1255320" y="3443760"/>
+            <a:ext cx="693720" cy="1002600"/>
           </a:xfrm>
           <a:prstGeom prst="roundRect">
             <a:avLst>
@@ -3366,8 +3373,8 @@
         </p:nvSpPr>
         <p:spPr>
           <a:xfrm>
-            <a:off x="4316760" y="3252960"/>
-            <a:ext cx="694080" cy="1002960"/>
+            <a:off x="2176920" y="3445920"/>
+            <a:ext cx="693720" cy="1002600"/>
           </a:xfrm>
           <a:prstGeom prst="roundRect">
             <a:avLst>
@@ -3411,8 +3418,8 @@
         </p:nvSpPr>
         <p:spPr>
           <a:xfrm>
-            <a:off x="7174440" y="3252960"/>
-            <a:ext cx="694080" cy="1002960"/>
+            <a:off x="5034240" y="3445920"/>
+            <a:ext cx="693720" cy="1002600"/>
           </a:xfrm>
           <a:prstGeom prst="roundRect">
             <a:avLst>
@@ -3456,8 +3463,8 @@
         </p:nvSpPr>
         <p:spPr>
           <a:xfrm>
-            <a:off x="4295160" y="4342680"/>
-            <a:ext cx="812520" cy="638640"/>
+            <a:off x="2155320" y="4535640"/>
+            <a:ext cx="812160" cy="639000"/>
           </a:xfrm>
           <a:prstGeom prst="rect">
             <a:avLst/>
@@ -3537,8 +3544,8 @@
         </p:nvSpPr>
         <p:spPr>
           <a:xfrm>
-            <a:off x="5102640" y="5776920"/>
-            <a:ext cx="1095120" cy="364320"/>
+            <a:off x="2962080" y="5969880"/>
+            <a:ext cx="1095480" cy="363960"/>
           </a:xfrm>
           <a:prstGeom prst="rect">
             <a:avLst/>
@@ -3588,8 +3595,8 @@
         </p:nvSpPr>
         <p:spPr>
           <a:xfrm>
-            <a:off x="3219120" y="451440"/>
-            <a:ext cx="4789080" cy="5238720"/>
+            <a:off x="1079280" y="644400"/>
+            <a:ext cx="4788360" cy="5238360"/>
           </a:xfrm>
           <a:prstGeom prst="rect">
             <a:avLst/>
@@ -3624,7 +3631,7 @@
         </p:nvSpPr>
         <p:spPr>
           <a:xfrm>
-            <a:off x="8549640" y="1540440"/>
+            <a:off x="6409440" y="1733400"/>
             <a:ext cx="887760" cy="360"/>
           </a:xfrm>
           <a:prstGeom prst="line">
@@ -3657,8 +3664,8 @@
         </p:nvSpPr>
         <p:spPr>
           <a:xfrm>
-            <a:off x="5299200" y="3249720"/>
-            <a:ext cx="694080" cy="1002960"/>
+            <a:off x="3159360" y="3442680"/>
+            <a:ext cx="693720" cy="1002600"/>
           </a:xfrm>
           <a:prstGeom prst="roundRect">
             <a:avLst>
@@ -3702,8 +3709,8 @@
         </p:nvSpPr>
         <p:spPr>
           <a:xfrm>
-            <a:off x="6221880" y="3251880"/>
-            <a:ext cx="694080" cy="1002960"/>
+            <a:off x="4082040" y="3444840"/>
+            <a:ext cx="693720" cy="1002600"/>
           </a:xfrm>
           <a:prstGeom prst="roundRect">
             <a:avLst>
@@ -3747,8 +3754,8 @@
         </p:nvSpPr>
         <p:spPr>
           <a:xfrm>
-            <a:off x="6200280" y="4341600"/>
-            <a:ext cx="812520" cy="638640"/>
+            <a:off x="4060440" y="4534560"/>
+            <a:ext cx="812160" cy="639000"/>
           </a:xfrm>
           <a:prstGeom prst="rect">
             <a:avLst/>
@@ -3828,8 +3835,8 @@
         </p:nvSpPr>
         <p:spPr>
           <a:xfrm>
-            <a:off x="5285160" y="4341600"/>
-            <a:ext cx="812520" cy="638640"/>
+            <a:off x="3145320" y="4534560"/>
+            <a:ext cx="812160" cy="639000"/>
           </a:xfrm>
           <a:prstGeom prst="rect">
             <a:avLst/>
@@ -3909,8 +3916,8 @@
         </p:nvSpPr>
         <p:spPr>
           <a:xfrm>
-            <a:off x="8713800" y="3289680"/>
-            <a:ext cx="528120" cy="364320"/>
+            <a:off x="6573600" y="3482640"/>
+            <a:ext cx="528480" cy="363960"/>
           </a:xfrm>
           <a:prstGeom prst="rect">
             <a:avLst/>
@@ -3960,8 +3967,8 @@
         </p:nvSpPr>
         <p:spPr>
           <a:xfrm>
-            <a:off x="9484560" y="3274560"/>
-            <a:ext cx="1212120" cy="364320"/>
+            <a:off x="7344000" y="3467520"/>
+            <a:ext cx="1212480" cy="363960"/>
           </a:xfrm>
           <a:prstGeom prst="rect">
             <a:avLst/>
@@ -4031,7 +4038,7 @@
         </p:nvSpPr>
         <p:spPr>
           <a:xfrm>
-            <a:off x="8563320" y="5329080"/>
+            <a:off x="6423480" y="5522040"/>
             <a:ext cx="887760" cy="360"/>
           </a:xfrm>
           <a:prstGeom prst="line">

</xml_diff>